<commit_message>
minor updates to the file
</commit_message>
<xml_diff>
--- a/Presentation1.pptx
+++ b/Presentation1.pptx
@@ -111,6 +111,22 @@
       </a:defRPr>
     </a:lvl9pPr>
   </p:defaultTextStyle>
+  <p:extLst>
+    <p:ext uri="{EFAFB233-063F-42B5-8137-9DF3F51BA10A}">
+      <p15:sldGuideLst xmlns:p15="http://schemas.microsoft.com/office/powerpoint/2012/main">
+        <p15:guide id="1" orient="horz" pos="2160">
+          <p15:clr>
+            <a:srgbClr val="A4A3A4"/>
+          </p15:clr>
+        </p15:guide>
+        <p15:guide id="2" pos="2880">
+          <p15:clr>
+            <a:srgbClr val="A4A3A4"/>
+          </p15:clr>
+        </p15:guide>
+      </p15:sldGuideLst>
+    </p:ext>
+  </p:extLst>
 </p:presentation>
 </file>
 
@@ -295,7 +311,7 @@
           <a:p>
             <a:fld id="{B52166F8-8ABA-E241-831D-565BF6BD1450}" type="datetimeFigureOut">
               <a:rPr lang="en-US" smtClean="0"/>
-              <a:t>8/18/16</a:t>
+              <a:t>5/12/17</a:t>
             </a:fld>
             <a:endParaRPr lang="en-US"/>
           </a:p>
@@ -465,7 +481,7 @@
           <a:p>
             <a:fld id="{B52166F8-8ABA-E241-831D-565BF6BD1450}" type="datetimeFigureOut">
               <a:rPr lang="en-US" smtClean="0"/>
-              <a:t>8/18/16</a:t>
+              <a:t>5/12/17</a:t>
             </a:fld>
             <a:endParaRPr lang="en-US"/>
           </a:p>
@@ -645,7 +661,7 @@
           <a:p>
             <a:fld id="{B52166F8-8ABA-E241-831D-565BF6BD1450}" type="datetimeFigureOut">
               <a:rPr lang="en-US" smtClean="0"/>
-              <a:t>8/18/16</a:t>
+              <a:t>5/12/17</a:t>
             </a:fld>
             <a:endParaRPr lang="en-US"/>
           </a:p>
@@ -815,7 +831,7 @@
           <a:p>
             <a:fld id="{B52166F8-8ABA-E241-831D-565BF6BD1450}" type="datetimeFigureOut">
               <a:rPr lang="en-US" smtClean="0"/>
-              <a:t>8/18/16</a:t>
+              <a:t>5/12/17</a:t>
             </a:fld>
             <a:endParaRPr lang="en-US"/>
           </a:p>
@@ -1061,7 +1077,7 @@
           <a:p>
             <a:fld id="{B52166F8-8ABA-E241-831D-565BF6BD1450}" type="datetimeFigureOut">
               <a:rPr lang="en-US" smtClean="0"/>
-              <a:t>8/18/16</a:t>
+              <a:t>5/12/17</a:t>
             </a:fld>
             <a:endParaRPr lang="en-US"/>
           </a:p>
@@ -1349,7 +1365,7 @@
           <a:p>
             <a:fld id="{B52166F8-8ABA-E241-831D-565BF6BD1450}" type="datetimeFigureOut">
               <a:rPr lang="en-US" smtClean="0"/>
-              <a:t>8/18/16</a:t>
+              <a:t>5/12/17</a:t>
             </a:fld>
             <a:endParaRPr lang="en-US"/>
           </a:p>
@@ -1771,7 +1787,7 @@
           <a:p>
             <a:fld id="{B52166F8-8ABA-E241-831D-565BF6BD1450}" type="datetimeFigureOut">
               <a:rPr lang="en-US" smtClean="0"/>
-              <a:t>8/18/16</a:t>
+              <a:t>5/12/17</a:t>
             </a:fld>
             <a:endParaRPr lang="en-US"/>
           </a:p>
@@ -1889,7 +1905,7 @@
           <a:p>
             <a:fld id="{B52166F8-8ABA-E241-831D-565BF6BD1450}" type="datetimeFigureOut">
               <a:rPr lang="en-US" smtClean="0"/>
-              <a:t>8/18/16</a:t>
+              <a:t>5/12/17</a:t>
             </a:fld>
             <a:endParaRPr lang="en-US"/>
           </a:p>
@@ -1984,7 +2000,7 @@
           <a:p>
             <a:fld id="{B52166F8-8ABA-E241-831D-565BF6BD1450}" type="datetimeFigureOut">
               <a:rPr lang="en-US" smtClean="0"/>
-              <a:t>8/18/16</a:t>
+              <a:t>5/12/17</a:t>
             </a:fld>
             <a:endParaRPr lang="en-US"/>
           </a:p>
@@ -2261,7 +2277,7 @@
           <a:p>
             <a:fld id="{B52166F8-8ABA-E241-831D-565BF6BD1450}" type="datetimeFigureOut">
               <a:rPr lang="en-US" smtClean="0"/>
-              <a:t>8/18/16</a:t>
+              <a:t>5/12/17</a:t>
             </a:fld>
             <a:endParaRPr lang="en-US"/>
           </a:p>
@@ -2514,7 +2530,7 @@
           <a:p>
             <a:fld id="{B52166F8-8ABA-E241-831D-565BF6BD1450}" type="datetimeFigureOut">
               <a:rPr lang="en-US" smtClean="0"/>
-              <a:t>8/18/16</a:t>
+              <a:t>5/12/17</a:t>
             </a:fld>
             <a:endParaRPr lang="en-US"/>
           </a:p>
@@ -2727,7 +2743,7 @@
           <a:p>
             <a:fld id="{B52166F8-8ABA-E241-831D-565BF6BD1450}" type="datetimeFigureOut">
               <a:rPr lang="en-US" smtClean="0"/>
-              <a:t>8/18/16</a:t>
+              <a:t>5/12/17</a:t>
             </a:fld>
             <a:endParaRPr lang="en-US"/>
           </a:p>
@@ -3150,19 +3166,6 @@
             </a:r>
             <a:endParaRPr lang="en-US" sz="4000" dirty="0" smtClean="0"/>
           </a:p>
-          <a:p>
-            <a:r>
-              <a:rPr lang="en-US" sz="2000" dirty="0" smtClean="0"/>
-              <a:t>Scientific Research Department</a:t>
-            </a:r>
-          </a:p>
-          <a:p>
-            <a:r>
-              <a:rPr lang="en-US" sz="2000" dirty="0" smtClean="0"/>
-              <a:t>  Egyptian Meteorological Authority</a:t>
-            </a:r>
-            <a:endParaRPr lang="en-US" sz="2000" dirty="0"/>
-          </a:p>
         </p:txBody>
       </p:sp>
     </p:spTree>
@@ -3178,7 +3181,7 @@
   <p:timing>
     <p:tnLst>
       <p:par>
-        <p:cTn xmlns:p14="http://schemas.microsoft.com/office/powerpoint/2010/main" id="1" dur="indefinite" restart="never" nodeType="tmRoot"/>
+        <p:cTn id="1" dur="indefinite" restart="never" nodeType="tmRoot"/>
       </p:par>
     </p:tnLst>
   </p:timing>
@@ -3285,7 +3288,7 @@
   <p:timing>
     <p:tnLst>
       <p:par>
-        <p:cTn xmlns:p14="http://schemas.microsoft.com/office/powerpoint/2010/main" id="1" dur="indefinite" restart="never" nodeType="tmRoot"/>
+        <p:cTn id="1" dur="indefinite" restart="never" nodeType="tmRoot"/>
       </p:par>
     </p:tnLst>
   </p:timing>
@@ -3410,7 +3413,7 @@
   <p:timing>
     <p:tnLst>
       <p:par>
-        <p:cTn xmlns:p14="http://schemas.microsoft.com/office/powerpoint/2010/main" id="1" dur="indefinite" restart="never" nodeType="tmRoot"/>
+        <p:cTn id="1" dur="indefinite" restart="never" nodeType="tmRoot"/>
       </p:par>
     </p:tnLst>
   </p:timing>
@@ -3598,7 +3601,7 @@
   <p:timing>
     <p:tnLst>
       <p:par>
-        <p:cTn xmlns:p14="http://schemas.microsoft.com/office/powerpoint/2010/main" id="1" dur="indefinite" restart="never" nodeType="tmRoot"/>
+        <p:cTn id="1" dur="indefinite" restart="never" nodeType="tmRoot"/>
       </p:par>
     </p:tnLst>
   </p:timing>
@@ -3710,7 +3713,7 @@
   <p:timing>
     <p:tnLst>
       <p:par>
-        <p:cTn xmlns:p14="http://schemas.microsoft.com/office/powerpoint/2010/main" id="1" dur="indefinite" restart="never" nodeType="tmRoot"/>
+        <p:cTn id="1" dur="indefinite" restart="never" nodeType="tmRoot"/>
       </p:par>
     </p:tnLst>
   </p:timing>
@@ -3851,7 +3854,7 @@
   <p:timing>
     <p:tnLst>
       <p:par>
-        <p:cTn xmlns:p14="http://schemas.microsoft.com/office/powerpoint/2010/main" id="1" dur="indefinite" restart="never" nodeType="tmRoot"/>
+        <p:cTn id="1" dur="indefinite" restart="never" nodeType="tmRoot"/>
       </p:par>
     </p:tnLst>
   </p:timing>
@@ -4092,7 +4095,7 @@
   <p:timing>
     <p:tnLst>
       <p:par>
-        <p:cTn xmlns:p14="http://schemas.microsoft.com/office/powerpoint/2010/main" id="1" dur="indefinite" restart="never" nodeType="tmRoot"/>
+        <p:cTn id="1" dur="indefinite" restart="never" nodeType="tmRoot"/>
       </p:par>
     </p:tnLst>
   </p:timing>
@@ -4173,7 +4176,7 @@
   <p:timing>
     <p:tnLst>
       <p:par>
-        <p:cTn xmlns:p14="http://schemas.microsoft.com/office/powerpoint/2010/main" id="1" dur="indefinite" restart="never" nodeType="tmRoot"/>
+        <p:cTn id="1" dur="indefinite" restart="never" nodeType="tmRoot"/>
       </p:par>
     </p:tnLst>
   </p:timing>

</xml_diff>